<commit_message>
Problemas que o projeto tenta resolver
</commit_message>
<xml_diff>
--- a/Slides/Analise de Sistemas/Renato Antunes_PSI_AnaliseSistemas.pptx
+++ b/Slides/Analise de Sistemas/Renato Antunes_PSI_AnaliseSistemas.pptx
@@ -120,6 +120,10 @@
 </p:presentation>
 </file>
 
+<file path=ppt/revisionInfo.xml><?xml version="1.0" encoding="utf-8"?>
+<p1510:revInfo xmlns:a="http://schemas.openxmlformats.org/drawingml/2006/main" xmlns:r="http://schemas.openxmlformats.org/officeDocument/2006/relationships" xmlns:p1510="http://schemas.microsoft.com/office/powerpoint/2015/10/main"/>
+</file>
+
 <file path=ppt/slideLayouts/slideLayout1.xml><?xml version="1.0" encoding="utf-8"?>
 <p:sldLayout xmlns:a="http://schemas.openxmlformats.org/drawingml/2006/main" xmlns:r="http://schemas.openxmlformats.org/officeDocument/2006/relationships" xmlns:p="http://schemas.openxmlformats.org/presentationml/2006/main" showMasterSp="0" type="title" preserve="1">
   <p:cSld name="Diapositivo de título">
@@ -296,7 +300,7 @@
           </a:lstStyle>
           <a:p>
             <a:r>
-              <a:rPr lang="pt-PT" smtClean="0"/>
+              <a:rPr lang="pt-PT"/>
               <a:t>Clique para editar o estilo</a:t>
             </a:r>
             <a:endParaRPr lang="en-US" dirty="0"/>
@@ -416,7 +420,7 @@
           </a:lstStyle>
           <a:p>
             <a:r>
-              <a:rPr lang="pt-PT" smtClean="0"/>
+              <a:rPr lang="pt-PT"/>
               <a:t>Faça clique para editar o estilo</a:t>
             </a:r>
             <a:endParaRPr lang="en-US" dirty="0"/>
@@ -1366,7 +1370,7 @@
           </a:lstStyle>
           <a:p>
             <a:r>
-              <a:rPr lang="pt-PT" smtClean="0"/>
+              <a:rPr lang="pt-PT"/>
               <a:t>Clique para editar o estilo</a:t>
             </a:r>
             <a:endParaRPr lang="en-US" dirty="0"/>
@@ -1445,7 +1449,7 @@
           </a:lstStyle>
           <a:p>
             <a:r>
-              <a:rPr lang="pt-PT" smtClean="0"/>
+              <a:rPr lang="pt-PT"/>
               <a:t>Clique no ícone para adicionar uma imagem</a:t>
             </a:r>
             <a:endParaRPr lang="en-US" dirty="0"/>
@@ -1520,7 +1524,7 @@
           <a:p>
             <a:pPr lvl="0"/>
             <a:r>
-              <a:rPr lang="pt-PT" smtClean="0"/>
+              <a:rPr lang="pt-PT"/>
               <a:t>Clique para editar os estilos</a:t>
             </a:r>
           </a:p>
@@ -2432,7 +2436,7 @@
           </a:lstStyle>
           <a:p>
             <a:r>
-              <a:rPr lang="pt-PT" smtClean="0"/>
+              <a:rPr lang="pt-PT"/>
               <a:t>Clique para editar o estilo</a:t>
             </a:r>
             <a:endParaRPr lang="en-US" dirty="0"/>
@@ -2500,7 +2504,7 @@
           <a:p>
             <a:pPr lvl="0"/>
             <a:r>
-              <a:rPr lang="pt-PT" smtClean="0"/>
+              <a:rPr lang="pt-PT"/>
               <a:t>Clique para editar os estilos</a:t>
             </a:r>
           </a:p>
@@ -3490,7 +3494,7 @@
           </a:lstStyle>
           <a:p>
             <a:r>
-              <a:rPr lang="pt-PT" smtClean="0"/>
+              <a:rPr lang="pt-PT"/>
               <a:t>Clique para editar o estilo</a:t>
             </a:r>
             <a:endParaRPr lang="en-US" dirty="0"/>
@@ -3567,7 +3571,7 @@
           <a:p>
             <a:pPr lvl="0"/>
             <a:r>
-              <a:rPr lang="pt-PT" smtClean="0"/>
+              <a:rPr lang="pt-PT"/>
               <a:t>Clique para editar os estilos</a:t>
             </a:r>
           </a:p>
@@ -3634,7 +3638,7 @@
           <a:p>
             <a:pPr lvl="0"/>
             <a:r>
-              <a:rPr lang="pt-PT" smtClean="0"/>
+              <a:rPr lang="pt-PT"/>
               <a:t>Clique para editar os estilos</a:t>
             </a:r>
           </a:p>
@@ -4546,7 +4550,7 @@
           </a:lstStyle>
           <a:p>
             <a:r>
-              <a:rPr lang="pt-PT" smtClean="0"/>
+              <a:rPr lang="pt-PT"/>
               <a:t>Clique para editar o estilo</a:t>
             </a:r>
             <a:endParaRPr lang="en-US" dirty="0"/>
@@ -4667,7 +4671,7 @@
           <a:p>
             <a:pPr lvl="0"/>
             <a:r>
-              <a:rPr lang="pt-PT" smtClean="0"/>
+              <a:rPr lang="pt-PT"/>
               <a:t>Clique para editar os estilos</a:t>
             </a:r>
           </a:p>
@@ -4829,7 +4833,7 @@
           </a:lstStyle>
           <a:p>
             <a:r>
-              <a:rPr lang="pt-PT" smtClean="0"/>
+              <a:rPr lang="pt-PT"/>
               <a:t>Clique para editar o estilo</a:t>
             </a:r>
             <a:endParaRPr lang="en-US" dirty="0"/>
@@ -4904,7 +4908,7 @@
           <a:p>
             <a:pPr lvl="0"/>
             <a:r>
-              <a:rPr lang="pt-PT" smtClean="0"/>
+              <a:rPr lang="pt-PT"/>
               <a:t>Clique para editar os estilos</a:t>
             </a:r>
           </a:p>
@@ -4971,7 +4975,7 @@
           <a:p>
             <a:pPr lvl="0"/>
             <a:r>
-              <a:rPr lang="pt-PT" smtClean="0"/>
+              <a:rPr lang="pt-PT"/>
               <a:t>Clique para editar os estilos</a:t>
             </a:r>
           </a:p>
@@ -5045,7 +5049,7 @@
           <a:p>
             <a:pPr lvl="0"/>
             <a:r>
-              <a:rPr lang="pt-PT" smtClean="0"/>
+              <a:rPr lang="pt-PT"/>
               <a:t>Clique para editar os estilos</a:t>
             </a:r>
           </a:p>
@@ -5112,7 +5116,7 @@
           <a:p>
             <a:pPr lvl="0"/>
             <a:r>
-              <a:rPr lang="pt-PT" smtClean="0"/>
+              <a:rPr lang="pt-PT"/>
               <a:t>Clique para editar os estilos</a:t>
             </a:r>
           </a:p>
@@ -5186,7 +5190,7 @@
           <a:p>
             <a:pPr lvl="0"/>
             <a:r>
-              <a:rPr lang="pt-PT" smtClean="0"/>
+              <a:rPr lang="pt-PT"/>
               <a:t>Clique para editar os estilos</a:t>
             </a:r>
           </a:p>
@@ -5253,7 +5257,7 @@
           <a:p>
             <a:pPr lvl="0"/>
             <a:r>
-              <a:rPr lang="pt-PT" smtClean="0"/>
+              <a:rPr lang="pt-PT"/>
               <a:t>Clique para editar os estilos</a:t>
             </a:r>
           </a:p>
@@ -5453,7 +5457,7 @@
           </a:lstStyle>
           <a:p>
             <a:r>
-              <a:rPr lang="pt-PT" smtClean="0"/>
+              <a:rPr lang="pt-PT"/>
               <a:t>Clique para editar o estilo</a:t>
             </a:r>
             <a:endParaRPr lang="en-US" dirty="0"/>
@@ -5528,7 +5532,7 @@
           <a:p>
             <a:pPr lvl="0"/>
             <a:r>
-              <a:rPr lang="pt-PT" smtClean="0"/>
+              <a:rPr lang="pt-PT"/>
               <a:t>Clique para editar os estilos</a:t>
             </a:r>
           </a:p>
@@ -5606,7 +5610,7 @@
           </a:lstStyle>
           <a:p>
             <a:r>
-              <a:rPr lang="pt-PT" smtClean="0"/>
+              <a:rPr lang="pt-PT"/>
               <a:t>Clique no ícone para adicionar uma imagem</a:t>
             </a:r>
             <a:endParaRPr lang="en-US" dirty="0"/>
@@ -5674,7 +5678,7 @@
           <a:p>
             <a:pPr lvl="0"/>
             <a:r>
-              <a:rPr lang="pt-PT" smtClean="0"/>
+              <a:rPr lang="pt-PT"/>
               <a:t>Clique para editar os estilos</a:t>
             </a:r>
           </a:p>
@@ -5748,7 +5752,7 @@
           <a:p>
             <a:pPr lvl="0"/>
             <a:r>
-              <a:rPr lang="pt-PT" smtClean="0"/>
+              <a:rPr lang="pt-PT"/>
               <a:t>Clique para editar os estilos</a:t>
             </a:r>
           </a:p>
@@ -5826,7 +5830,7 @@
           </a:lstStyle>
           <a:p>
             <a:r>
-              <a:rPr lang="pt-PT" smtClean="0"/>
+              <a:rPr lang="pt-PT"/>
               <a:t>Clique no ícone para adicionar uma imagem</a:t>
             </a:r>
             <a:endParaRPr lang="en-US" dirty="0"/>
@@ -5894,7 +5898,7 @@
           <a:p>
             <a:pPr lvl="0"/>
             <a:r>
-              <a:rPr lang="pt-PT" smtClean="0"/>
+              <a:rPr lang="pt-PT"/>
               <a:t>Clique para editar os estilos</a:t>
             </a:r>
           </a:p>
@@ -5968,7 +5972,7 @@
           <a:p>
             <a:pPr lvl="0"/>
             <a:r>
-              <a:rPr lang="pt-PT" smtClean="0"/>
+              <a:rPr lang="pt-PT"/>
               <a:t>Clique para editar os estilos</a:t>
             </a:r>
           </a:p>
@@ -6046,7 +6050,7 @@
           </a:lstStyle>
           <a:p>
             <a:r>
-              <a:rPr lang="pt-PT" smtClean="0"/>
+              <a:rPr lang="pt-PT"/>
               <a:t>Clique no ícone para adicionar uma imagem</a:t>
             </a:r>
             <a:endParaRPr lang="en-US" dirty="0"/>
@@ -6114,7 +6118,7 @@
           <a:p>
             <a:pPr lvl="0"/>
             <a:r>
-              <a:rPr lang="pt-PT" smtClean="0"/>
+              <a:rPr lang="pt-PT"/>
               <a:t>Clique para editar os estilos</a:t>
             </a:r>
           </a:p>
@@ -6315,7 +6319,7 @@
           <a:lstStyle/>
           <a:p>
             <a:r>
-              <a:rPr lang="pt-PT" smtClean="0"/>
+              <a:rPr lang="pt-PT"/>
               <a:t>Clique para editar o estilo</a:t>
             </a:r>
             <a:endParaRPr lang="en-US" dirty="0"/>
@@ -6344,35 +6348,35 @@
           <a:p>
             <a:pPr lvl="0"/>
             <a:r>
-              <a:rPr lang="pt-PT" smtClean="0"/>
+              <a:rPr lang="pt-PT"/>
               <a:t>Clique para editar os estilos</a:t>
             </a:r>
           </a:p>
           <a:p>
             <a:pPr lvl="1"/>
             <a:r>
-              <a:rPr lang="pt-PT" smtClean="0"/>
+              <a:rPr lang="pt-PT"/>
               <a:t>Segundo nível</a:t>
             </a:r>
           </a:p>
           <a:p>
             <a:pPr lvl="2"/>
             <a:r>
-              <a:rPr lang="pt-PT" smtClean="0"/>
+              <a:rPr lang="pt-PT"/>
               <a:t>Terceiro nível</a:t>
             </a:r>
           </a:p>
           <a:p>
             <a:pPr lvl="3"/>
             <a:r>
-              <a:rPr lang="pt-PT" smtClean="0"/>
+              <a:rPr lang="pt-PT"/>
               <a:t>Quarto nível</a:t>
             </a:r>
           </a:p>
           <a:p>
             <a:pPr lvl="4"/>
             <a:r>
-              <a:rPr lang="pt-PT" smtClean="0"/>
+              <a:rPr lang="pt-PT"/>
               <a:t>Quinto nível</a:t>
             </a:r>
             <a:endParaRPr lang="en-US" dirty="0"/>
@@ -7287,7 +7291,7 @@
           <a:lstStyle/>
           <a:p>
             <a:r>
-              <a:rPr lang="pt-PT" smtClean="0"/>
+              <a:rPr lang="pt-PT"/>
               <a:t>Clique para editar o estilo</a:t>
             </a:r>
             <a:endParaRPr lang="en-US" dirty="0"/>
@@ -7316,35 +7320,35 @@
           <a:p>
             <a:pPr lvl="0"/>
             <a:r>
-              <a:rPr lang="pt-PT" smtClean="0"/>
+              <a:rPr lang="pt-PT"/>
               <a:t>Clique para editar os estilos</a:t>
             </a:r>
           </a:p>
           <a:p>
             <a:pPr lvl="1"/>
             <a:r>
-              <a:rPr lang="pt-PT" smtClean="0"/>
+              <a:rPr lang="pt-PT"/>
               <a:t>Segundo nível</a:t>
             </a:r>
           </a:p>
           <a:p>
             <a:pPr lvl="2"/>
             <a:r>
-              <a:rPr lang="pt-PT" smtClean="0"/>
+              <a:rPr lang="pt-PT"/>
               <a:t>Terceiro nível</a:t>
             </a:r>
           </a:p>
           <a:p>
             <a:pPr lvl="3"/>
             <a:r>
-              <a:rPr lang="pt-PT" smtClean="0"/>
+              <a:rPr lang="pt-PT"/>
               <a:t>Quarto nível</a:t>
             </a:r>
           </a:p>
           <a:p>
             <a:pPr lvl="4"/>
             <a:r>
-              <a:rPr lang="pt-PT" smtClean="0"/>
+              <a:rPr lang="pt-PT"/>
               <a:t>Quinto nível</a:t>
             </a:r>
             <a:endParaRPr lang="en-US" dirty="0"/>
@@ -7503,7 +7507,7 @@
           <a:lstStyle/>
           <a:p>
             <a:r>
-              <a:rPr lang="pt-PT" smtClean="0"/>
+              <a:rPr lang="pt-PT"/>
               <a:t>Clique para editar o estilo</a:t>
             </a:r>
             <a:endParaRPr lang="en-US" dirty="0"/>
@@ -7532,35 +7536,35 @@
           <a:p>
             <a:pPr lvl="0"/>
             <a:r>
-              <a:rPr lang="pt-PT" smtClean="0"/>
+              <a:rPr lang="pt-PT"/>
               <a:t>Clique para editar os estilos</a:t>
             </a:r>
           </a:p>
           <a:p>
             <a:pPr lvl="1"/>
             <a:r>
-              <a:rPr lang="pt-PT" smtClean="0"/>
+              <a:rPr lang="pt-PT"/>
               <a:t>Segundo nível</a:t>
             </a:r>
           </a:p>
           <a:p>
             <a:pPr lvl="2"/>
             <a:r>
-              <a:rPr lang="pt-PT" smtClean="0"/>
+              <a:rPr lang="pt-PT"/>
               <a:t>Terceiro nível</a:t>
             </a:r>
           </a:p>
           <a:p>
             <a:pPr lvl="3"/>
             <a:r>
-              <a:rPr lang="pt-PT" smtClean="0"/>
+              <a:rPr lang="pt-PT"/>
               <a:t>Quarto nível</a:t>
             </a:r>
           </a:p>
           <a:p>
             <a:pPr lvl="4"/>
             <a:r>
-              <a:rPr lang="pt-PT" smtClean="0"/>
+              <a:rPr lang="pt-PT"/>
               <a:t>Quinto nível</a:t>
             </a:r>
             <a:endParaRPr lang="en-US" dirty="0"/>
@@ -8474,7 +8478,7 @@
           </a:lstStyle>
           <a:p>
             <a:r>
-              <a:rPr lang="pt-PT" smtClean="0"/>
+              <a:rPr lang="pt-PT"/>
               <a:t>Clique para editar o estilo</a:t>
             </a:r>
             <a:endParaRPr lang="en-US" dirty="0"/>
@@ -8595,7 +8599,7 @@
           <a:p>
             <a:pPr lvl="0"/>
             <a:r>
-              <a:rPr lang="pt-PT" smtClean="0"/>
+              <a:rPr lang="pt-PT"/>
               <a:t>Clique para editar os estilos</a:t>
             </a:r>
           </a:p>
@@ -8748,7 +8752,7 @@
           <a:lstStyle/>
           <a:p>
             <a:r>
-              <a:rPr lang="pt-PT" smtClean="0"/>
+              <a:rPr lang="pt-PT"/>
               <a:t>Clique para editar o estilo</a:t>
             </a:r>
             <a:endParaRPr lang="en-US" dirty="0"/>
@@ -8779,35 +8783,35 @@
           <a:p>
             <a:pPr lvl="0"/>
             <a:r>
-              <a:rPr lang="pt-PT" smtClean="0"/>
+              <a:rPr lang="pt-PT"/>
               <a:t>Clique para editar os estilos</a:t>
             </a:r>
           </a:p>
           <a:p>
             <a:pPr lvl="1"/>
             <a:r>
-              <a:rPr lang="pt-PT" smtClean="0"/>
+              <a:rPr lang="pt-PT"/>
               <a:t>Segundo nível</a:t>
             </a:r>
           </a:p>
           <a:p>
             <a:pPr lvl="2"/>
             <a:r>
-              <a:rPr lang="pt-PT" smtClean="0"/>
+              <a:rPr lang="pt-PT"/>
               <a:t>Terceiro nível</a:t>
             </a:r>
           </a:p>
           <a:p>
             <a:pPr lvl="3"/>
             <a:r>
-              <a:rPr lang="pt-PT" smtClean="0"/>
+              <a:rPr lang="pt-PT"/>
               <a:t>Quarto nível</a:t>
             </a:r>
           </a:p>
           <a:p>
             <a:pPr lvl="4"/>
             <a:r>
-              <a:rPr lang="pt-PT" smtClean="0"/>
+              <a:rPr lang="pt-PT"/>
               <a:t>Quinto nível</a:t>
             </a:r>
             <a:endParaRPr lang="en-US" dirty="0"/>
@@ -8838,35 +8842,35 @@
           <a:p>
             <a:pPr lvl="0"/>
             <a:r>
-              <a:rPr lang="pt-PT" smtClean="0"/>
+              <a:rPr lang="pt-PT"/>
               <a:t>Clique para editar os estilos</a:t>
             </a:r>
           </a:p>
           <a:p>
             <a:pPr lvl="1"/>
             <a:r>
-              <a:rPr lang="pt-PT" smtClean="0"/>
+              <a:rPr lang="pt-PT"/>
               <a:t>Segundo nível</a:t>
             </a:r>
           </a:p>
           <a:p>
             <a:pPr lvl="2"/>
             <a:r>
-              <a:rPr lang="pt-PT" smtClean="0"/>
+              <a:rPr lang="pt-PT"/>
               <a:t>Terceiro nível</a:t>
             </a:r>
           </a:p>
           <a:p>
             <a:pPr lvl="3"/>
             <a:r>
-              <a:rPr lang="pt-PT" smtClean="0"/>
+              <a:rPr lang="pt-PT"/>
               <a:t>Quarto nível</a:t>
             </a:r>
           </a:p>
           <a:p>
             <a:pPr lvl="4"/>
             <a:r>
-              <a:rPr lang="pt-PT" smtClean="0"/>
+              <a:rPr lang="pt-PT"/>
               <a:t>Quinto nível</a:t>
             </a:r>
             <a:endParaRPr lang="en-US" dirty="0"/>
@@ -8988,7 +8992,7 @@
           </a:lstStyle>
           <a:p>
             <a:r>
-              <a:rPr lang="pt-PT" smtClean="0"/>
+              <a:rPr lang="pt-PT"/>
               <a:t>Clique para editar o estilo</a:t>
             </a:r>
             <a:endParaRPr lang="en-US" dirty="0"/>
@@ -9060,7 +9064,7 @@
           <a:p>
             <a:pPr lvl="0"/>
             <a:r>
-              <a:rPr lang="pt-PT" smtClean="0"/>
+              <a:rPr lang="pt-PT"/>
               <a:t>Clique para editar os estilos</a:t>
             </a:r>
           </a:p>
@@ -9090,35 +9094,35 @@
           <a:p>
             <a:pPr lvl="0"/>
             <a:r>
-              <a:rPr lang="pt-PT" smtClean="0"/>
+              <a:rPr lang="pt-PT"/>
               <a:t>Clique para editar os estilos</a:t>
             </a:r>
           </a:p>
           <a:p>
             <a:pPr lvl="1"/>
             <a:r>
-              <a:rPr lang="pt-PT" smtClean="0"/>
+              <a:rPr lang="pt-PT"/>
               <a:t>Segundo nível</a:t>
             </a:r>
           </a:p>
           <a:p>
             <a:pPr lvl="2"/>
             <a:r>
-              <a:rPr lang="pt-PT" smtClean="0"/>
+              <a:rPr lang="pt-PT"/>
               <a:t>Terceiro nível</a:t>
             </a:r>
           </a:p>
           <a:p>
             <a:pPr lvl="3"/>
             <a:r>
-              <a:rPr lang="pt-PT" smtClean="0"/>
+              <a:rPr lang="pt-PT"/>
               <a:t>Quarto nível</a:t>
             </a:r>
           </a:p>
           <a:p>
             <a:pPr lvl="4"/>
             <a:r>
-              <a:rPr lang="pt-PT" smtClean="0"/>
+              <a:rPr lang="pt-PT"/>
               <a:t>Quinto nível</a:t>
             </a:r>
             <a:endParaRPr lang="en-US" dirty="0"/>
@@ -9190,7 +9194,7 @@
           <a:p>
             <a:pPr lvl="0"/>
             <a:r>
-              <a:rPr lang="pt-PT" smtClean="0"/>
+              <a:rPr lang="pt-PT"/>
               <a:t>Clique para editar os estilos</a:t>
             </a:r>
           </a:p>
@@ -9248,35 +9252,35 @@
           <a:p>
             <a:pPr lvl="0"/>
             <a:r>
-              <a:rPr lang="pt-PT" smtClean="0"/>
+              <a:rPr lang="pt-PT"/>
               <a:t>Clique para editar os estilos</a:t>
             </a:r>
           </a:p>
           <a:p>
             <a:pPr lvl="1"/>
             <a:r>
-              <a:rPr lang="pt-PT" smtClean="0"/>
+              <a:rPr lang="pt-PT"/>
               <a:t>Segundo nível</a:t>
             </a:r>
           </a:p>
           <a:p>
             <a:pPr lvl="2"/>
             <a:r>
-              <a:rPr lang="pt-PT" smtClean="0"/>
+              <a:rPr lang="pt-PT"/>
               <a:t>Terceiro nível</a:t>
             </a:r>
           </a:p>
           <a:p>
             <a:pPr lvl="3"/>
             <a:r>
-              <a:rPr lang="pt-PT" smtClean="0"/>
+              <a:rPr lang="pt-PT"/>
               <a:t>Quarto nível</a:t>
             </a:r>
           </a:p>
           <a:p>
             <a:pPr lvl="4"/>
             <a:r>
-              <a:rPr lang="pt-PT" smtClean="0"/>
+              <a:rPr lang="pt-PT"/>
               <a:t>Quinto nível</a:t>
             </a:r>
             <a:endParaRPr lang="en-US" dirty="0"/>
@@ -9403,7 +9407,7 @@
           </a:lstStyle>
           <a:p>
             <a:r>
-              <a:rPr lang="pt-PT" smtClean="0"/>
+              <a:rPr lang="pt-PT"/>
               <a:t>Clique para editar o estilo</a:t>
             </a:r>
             <a:endParaRPr lang="en-US" dirty="0"/>
@@ -10448,7 +10452,7 @@
           </a:lstStyle>
           <a:p>
             <a:r>
-              <a:rPr lang="pt-PT" smtClean="0"/>
+              <a:rPr lang="pt-PT"/>
               <a:t>Clique para editar o estilo</a:t>
             </a:r>
             <a:endParaRPr lang="en-US" dirty="0"/>
@@ -10479,35 +10483,35 @@
           <a:p>
             <a:pPr lvl="0"/>
             <a:r>
-              <a:rPr lang="pt-PT" smtClean="0"/>
+              <a:rPr lang="pt-PT"/>
               <a:t>Clique para editar os estilos</a:t>
             </a:r>
           </a:p>
           <a:p>
             <a:pPr lvl="1"/>
             <a:r>
-              <a:rPr lang="pt-PT" smtClean="0"/>
+              <a:rPr lang="pt-PT"/>
               <a:t>Segundo nível</a:t>
             </a:r>
           </a:p>
           <a:p>
             <a:pPr lvl="2"/>
             <a:r>
-              <a:rPr lang="pt-PT" smtClean="0"/>
+              <a:rPr lang="pt-PT"/>
               <a:t>Terceiro nível</a:t>
             </a:r>
           </a:p>
           <a:p>
             <a:pPr lvl="3"/>
             <a:r>
-              <a:rPr lang="pt-PT" smtClean="0"/>
+              <a:rPr lang="pt-PT"/>
               <a:t>Quarto nível</a:t>
             </a:r>
           </a:p>
           <a:p>
             <a:pPr lvl="4"/>
             <a:r>
-              <a:rPr lang="pt-PT" smtClean="0"/>
+              <a:rPr lang="pt-PT"/>
               <a:t>Quinto nível</a:t>
             </a:r>
             <a:endParaRPr lang="en-US" dirty="0"/>
@@ -10580,7 +10584,7 @@
           <a:p>
             <a:pPr lvl="0"/>
             <a:r>
-              <a:rPr lang="pt-PT" smtClean="0"/>
+              <a:rPr lang="pt-PT"/>
               <a:t>Clique para editar os estilos</a:t>
             </a:r>
           </a:p>
@@ -11531,7 +11535,7 @@
           </a:lstStyle>
           <a:p>
             <a:r>
-              <a:rPr lang="pt-PT" smtClean="0"/>
+              <a:rPr lang="pt-PT"/>
               <a:t>Clique para editar o estilo</a:t>
             </a:r>
             <a:endParaRPr lang="en-US" dirty="0"/>
@@ -11613,7 +11617,7 @@
               <a:buNone/>
             </a:pPr>
             <a:r>
-              <a:rPr lang="pt-PT" smtClean="0"/>
+              <a:rPr lang="pt-PT"/>
               <a:t>Clique no ícone para adicionar uma imagem</a:t>
             </a:r>
             <a:endParaRPr lang="en-US" dirty="0"/>
@@ -11688,7 +11692,7 @@
           <a:p>
             <a:pPr lvl="0"/>
             <a:r>
-              <a:rPr lang="pt-PT" smtClean="0"/>
+              <a:rPr lang="pt-PT"/>
               <a:t>Clique para editar os estilos</a:t>
             </a:r>
           </a:p>
@@ -12606,7 +12610,7 @@
           <a:lstStyle/>
           <a:p>
             <a:r>
-              <a:rPr lang="pt-PT" smtClean="0"/>
+              <a:rPr lang="pt-PT"/>
               <a:t>Clique para editar o estilo</a:t>
             </a:r>
             <a:endParaRPr lang="en-US" dirty="0"/>
@@ -12640,35 +12644,35 @@
           <a:p>
             <a:pPr lvl="0"/>
             <a:r>
-              <a:rPr lang="pt-PT" smtClean="0"/>
+              <a:rPr lang="pt-PT"/>
               <a:t>Clique para editar os estilos</a:t>
             </a:r>
           </a:p>
           <a:p>
             <a:pPr lvl="1"/>
             <a:r>
-              <a:rPr lang="pt-PT" smtClean="0"/>
+              <a:rPr lang="pt-PT"/>
               <a:t>Segundo nível</a:t>
             </a:r>
           </a:p>
           <a:p>
             <a:pPr lvl="2"/>
             <a:r>
-              <a:rPr lang="pt-PT" smtClean="0"/>
+              <a:rPr lang="pt-PT"/>
               <a:t>Terceiro nível</a:t>
             </a:r>
           </a:p>
           <a:p>
             <a:pPr lvl="3"/>
             <a:r>
-              <a:rPr lang="pt-PT" smtClean="0"/>
+              <a:rPr lang="pt-PT"/>
               <a:t>Quarto nível</a:t>
             </a:r>
           </a:p>
           <a:p>
             <a:pPr lvl="4"/>
             <a:r>
-              <a:rPr lang="pt-PT" smtClean="0"/>
+              <a:rPr lang="pt-PT"/>
               <a:t>Quinto nível</a:t>
             </a:r>
             <a:endParaRPr lang="en-US" dirty="0"/>
@@ -13406,10 +13410,9 @@
           <a:p>
             <a:pPr algn="ctr"/>
             <a:r>
-              <a:rPr lang="pt-PT" sz="6000" b="1" dirty="0" smtClean="0"/>
+              <a:rPr lang="pt-PT" sz="6000" b="1" dirty="0"/>
               <a:t>Análise Sistemas</a:t>
             </a:r>
-            <a:endParaRPr lang="pt-PT" sz="6000" b="1" dirty="0"/>
           </a:p>
         </p:txBody>
       </p:sp>
@@ -13423,13 +13426,6 @@
   <p:clrMapOvr>
     <a:masterClrMapping/>
   </p:clrMapOvr>
-  <p:timing>
-    <p:tnLst>
-      <p:par>
-        <p:cTn id="1" dur="indefinite" restart="never" nodeType="tmRoot"/>
-      </p:par>
-    </p:tnLst>
-  </p:timing>
 </p:sld>
 </file>
 
@@ -13466,10 +13462,9 @@
           <a:lstStyle/>
           <a:p>
             <a:r>
-              <a:rPr lang="pt-PT" dirty="0" smtClean="0"/>
+              <a:rPr lang="pt-PT" dirty="0"/>
               <a:t>Projectary</a:t>
             </a:r>
-            <a:endParaRPr lang="pt-PT" dirty="0"/>
           </a:p>
         </p:txBody>
       </p:sp>
@@ -13509,7 +13504,7 @@
           </a:p>
           <a:p>
             <a:r>
-              <a:rPr lang="pt-PT" dirty="0" smtClean="0"/>
+              <a:rPr lang="pt-PT" dirty="0"/>
               <a:t>Solução web para gerir projetos finais.</a:t>
             </a:r>
           </a:p>
@@ -13517,7 +13512,7 @@
             <a:pPr marL="0" indent="0">
               <a:buNone/>
             </a:pPr>
-            <a:endParaRPr lang="pt-PT" dirty="0" smtClean="0"/>
+            <a:endParaRPr lang="pt-PT" dirty="0"/>
           </a:p>
           <a:p>
             <a:pPr marL="0" indent="0">
@@ -13531,48 +13526,27 @@
                   </a:schemeClr>
                 </a:solidFill>
               </a:rPr>
-              <a:t>Componentes do </a:t>
+              <a:t>Componentes do projeto:</a:t>
             </a:r>
-            <a:r>
-              <a:rPr lang="pt-PT" sz="2000" b="1" dirty="0" smtClean="0">
-                <a:solidFill>
-                  <a:schemeClr val="accent1">
-                    <a:lumMod val="50000"/>
-                  </a:schemeClr>
-                </a:solidFill>
-              </a:rPr>
-              <a:t>projeto:</a:t>
-            </a:r>
-            <a:endParaRPr lang="pt-PT" sz="2000" b="1" dirty="0">
-              <a:solidFill>
-                <a:schemeClr val="accent1">
-                  <a:lumMod val="50000"/>
-                </a:schemeClr>
-              </a:solidFill>
-            </a:endParaRPr>
           </a:p>
           <a:p>
             <a:pPr lvl="2"/>
             <a:r>
               <a:rPr lang="pt-PT" dirty="0"/>
-              <a:t>E</a:t>
-            </a:r>
-            <a:r>
-              <a:rPr lang="pt-PT" dirty="0" smtClean="0"/>
-              <a:t>ntrega de enunciados, relatórios e todas as componentes de avaliação.</a:t>
+              <a:t>Entrega de enunciados, relatórios e todas as componentes de avaliação.</a:t>
             </a:r>
           </a:p>
           <a:p>
             <a:pPr lvl="2"/>
             <a:r>
-              <a:rPr lang="pt-PT" dirty="0" smtClean="0"/>
+              <a:rPr lang="pt-PT" dirty="0"/>
               <a:t>Candidatura a um projeto</a:t>
             </a:r>
           </a:p>
           <a:p>
             <a:pPr lvl="2"/>
             <a:r>
-              <a:rPr lang="pt-PT" dirty="0" smtClean="0"/>
+              <a:rPr lang="pt-PT" dirty="0"/>
               <a:t>Criação de perfil de utilizador</a:t>
             </a:r>
           </a:p>
@@ -13580,13 +13554,13 @@
             <a:pPr marL="0" indent="0">
               <a:buNone/>
             </a:pPr>
-            <a:endParaRPr lang="pt-PT" dirty="0" smtClean="0"/>
+            <a:endParaRPr lang="pt-PT" dirty="0"/>
           </a:p>
           <a:p>
             <a:pPr marL="0" indent="0">
               <a:buNone/>
             </a:pPr>
-            <a:endParaRPr lang="pt-PT" dirty="0" smtClean="0"/>
+            <a:endParaRPr lang="pt-PT" dirty="0"/>
           </a:p>
           <a:p>
             <a:pPr marL="0" indent="0">
@@ -14306,7 +14280,7 @@
           <a:lstStyle/>
           <a:p>
             <a:r>
-              <a:rPr lang="pt-PT" b="1" dirty="0" smtClean="0"/>
+              <a:rPr lang="pt-PT" b="1" dirty="0"/>
               <a:t>Áreas Funcionais</a:t>
             </a:r>
             <a:endParaRPr lang="pt-PT" dirty="0"/>
@@ -14341,7 +14315,7 @@
               </a:lnSpc>
             </a:pPr>
             <a:r>
-              <a:rPr lang="pt-PT" dirty="0" smtClean="0"/>
+              <a:rPr lang="pt-PT" dirty="0"/>
               <a:t>Análise de Sistemas  </a:t>
             </a:r>
           </a:p>
@@ -14352,7 +14326,7 @@
               </a:lnSpc>
             </a:pPr>
             <a:r>
-              <a:rPr lang="pt-PT" dirty="0" smtClean="0"/>
+              <a:rPr lang="pt-PT" dirty="0"/>
               <a:t>Base de Dados</a:t>
             </a:r>
           </a:p>
@@ -14363,7 +14337,7 @@
               </a:lnSpc>
             </a:pPr>
             <a:r>
-              <a:rPr lang="pt-PT" dirty="0" smtClean="0"/>
+              <a:rPr lang="pt-PT" dirty="0"/>
               <a:t>Front-end</a:t>
             </a:r>
           </a:p>
@@ -14374,7 +14348,7 @@
               </a:lnSpc>
             </a:pPr>
             <a:r>
-              <a:rPr lang="pt-PT" dirty="0" smtClean="0"/>
+              <a:rPr lang="pt-PT" dirty="0"/>
               <a:t>API</a:t>
             </a:r>
           </a:p>
@@ -14385,7 +14359,7 @@
               </a:lnSpc>
             </a:pPr>
             <a:r>
-              <a:rPr lang="pt-PT" dirty="0" smtClean="0"/>
+              <a:rPr lang="pt-PT" dirty="0"/>
               <a:t>Testes</a:t>
             </a:r>
           </a:p>
@@ -14646,7 +14620,7 @@
               </a:lnSpc>
             </a:pPr>
             <a:r>
-              <a:rPr lang="pt-PT" sz="1900" b="1" dirty="0" smtClean="0">
+              <a:rPr lang="pt-PT" sz="1900" b="1" dirty="0">
                 <a:solidFill>
                   <a:schemeClr val="accent1">
                     <a:lumMod val="50000"/>
@@ -14663,7 +14637,7 @@
               </a:lnSpc>
             </a:pPr>
             <a:r>
-              <a:rPr lang="pt-PT" dirty="0" smtClean="0"/>
+              <a:rPr lang="pt-PT" dirty="0"/>
               <a:t>Requisitos do sistema</a:t>
             </a:r>
           </a:p>
@@ -14674,7 +14648,7 @@
               </a:lnSpc>
             </a:pPr>
             <a:r>
-              <a:rPr lang="pt-PT" dirty="0" smtClean="0"/>
+              <a:rPr lang="pt-PT" dirty="0"/>
               <a:t>Diagramas</a:t>
             </a:r>
           </a:p>
@@ -14685,12 +14659,8 @@
               </a:lnSpc>
             </a:pPr>
             <a:r>
-              <a:rPr lang="pt-PT" dirty="0" smtClean="0"/>
-              <a:t>Apresentação do </a:t>
-            </a:r>
-            <a:r>
-              <a:rPr lang="pt-PT" dirty="0" smtClean="0"/>
-              <a:t>projeto</a:t>
+              <a:rPr lang="pt-PT" dirty="0"/>
+              <a:t>Apresentação do projeto</a:t>
             </a:r>
           </a:p>
           <a:p>
@@ -14700,10 +14670,9 @@
               </a:lnSpc>
             </a:pPr>
             <a:r>
-              <a:rPr lang="pt-PT" dirty="0" smtClean="0"/>
+              <a:rPr lang="pt-PT" dirty="0"/>
               <a:t>Relatório</a:t>
             </a:r>
-            <a:endParaRPr lang="pt-PT" dirty="0" smtClean="0"/>
           </a:p>
           <a:p>
             <a:pPr>
@@ -14712,16 +14681,6 @@
               </a:lnSpc>
             </a:pPr>
             <a:r>
-              <a:rPr lang="pt-PT" sz="1900" b="1" dirty="0" smtClean="0">
-                <a:solidFill>
-                  <a:schemeClr val="accent1">
-                    <a:lumMod val="50000"/>
-                  </a:schemeClr>
-                </a:solidFill>
-              </a:rPr>
-              <a:t>BD </a:t>
-            </a:r>
-            <a:r>
               <a:rPr lang="pt-PT" sz="1900" b="1" dirty="0">
                 <a:solidFill>
                   <a:schemeClr val="accent1">
@@ -14729,17 +14688,7 @@
                   </a:schemeClr>
                 </a:solidFill>
               </a:rPr>
-              <a:t>Responsável por</a:t>
-            </a:r>
-            <a:r>
-              <a:rPr lang="pt-PT" sz="1900" b="1" dirty="0" smtClean="0">
-                <a:solidFill>
-                  <a:schemeClr val="accent1">
-                    <a:lumMod val="50000"/>
-                  </a:schemeClr>
-                </a:solidFill>
-              </a:rPr>
-              <a:t>:</a:t>
+              <a:t>BD Responsável por:</a:t>
             </a:r>
           </a:p>
           <a:p>
@@ -14749,7 +14698,7 @@
               </a:lnSpc>
             </a:pPr>
             <a:r>
-              <a:rPr lang="pt-PT" dirty="0" smtClean="0"/>
+              <a:rPr lang="pt-PT" dirty="0"/>
               <a:t>Desenho da BD</a:t>
             </a:r>
           </a:p>
@@ -14760,12 +14709,8 @@
               </a:lnSpc>
             </a:pPr>
             <a:r>
-              <a:rPr lang="pt-PT" dirty="0" smtClean="0"/>
-              <a:t>Conceção da </a:t>
-            </a:r>
-            <a:r>
-              <a:rPr lang="pt-PT" dirty="0" smtClean="0"/>
-              <a:t>BD</a:t>
+              <a:rPr lang="pt-PT" dirty="0"/>
+              <a:t>Conceção da BD</a:t>
             </a:r>
           </a:p>
           <a:p>
@@ -14775,10 +14720,9 @@
               </a:lnSpc>
             </a:pPr>
             <a:r>
-              <a:rPr lang="pt-PT" dirty="0" smtClean="0"/>
+              <a:rPr lang="pt-PT" dirty="0"/>
               <a:t>Criação de procedimentos</a:t>
             </a:r>
-            <a:endParaRPr lang="pt-PT" dirty="0" smtClean="0"/>
           </a:p>
           <a:p>
             <a:pPr>
@@ -14787,16 +14731,6 @@
               </a:lnSpc>
             </a:pPr>
             <a:r>
-              <a:rPr lang="pt-PT" sz="1900" b="1" dirty="0" smtClean="0">
-                <a:solidFill>
-                  <a:schemeClr val="accent1">
-                    <a:lumMod val="50000"/>
-                  </a:schemeClr>
-                </a:solidFill>
-              </a:rPr>
-              <a:t>Front-end </a:t>
-            </a:r>
-            <a:r>
               <a:rPr lang="pt-PT" sz="1900" b="1" dirty="0">
                 <a:solidFill>
                   <a:schemeClr val="accent1">
@@ -14804,17 +14738,7 @@
                   </a:schemeClr>
                 </a:solidFill>
               </a:rPr>
-              <a:t>Responsável por</a:t>
-            </a:r>
-            <a:r>
-              <a:rPr lang="pt-PT" sz="1900" b="1" dirty="0" smtClean="0">
-                <a:solidFill>
-                  <a:schemeClr val="accent1">
-                    <a:lumMod val="50000"/>
-                  </a:schemeClr>
-                </a:solidFill>
-              </a:rPr>
-              <a:t>:</a:t>
+              <a:t>Front-end Responsável por:</a:t>
             </a:r>
           </a:p>
           <a:p>
@@ -14824,7 +14748,7 @@
               </a:lnSpc>
             </a:pPr>
             <a:r>
-              <a:rPr lang="pt-PT" dirty="0" smtClean="0"/>
+              <a:rPr lang="pt-PT" dirty="0"/>
               <a:t>Toda a interação direta com o utilizador</a:t>
             </a:r>
           </a:p>
@@ -15102,10 +15026,9 @@
               </a:lnSpc>
             </a:pPr>
             <a:r>
-              <a:rPr lang="pt-PT" sz="1300" dirty="0" smtClean="0"/>
+              <a:rPr lang="pt-PT" sz="1300" dirty="0"/>
               <a:t>Todo o Back-end</a:t>
             </a:r>
-            <a:endParaRPr lang="pt-PT" sz="1300" dirty="0"/>
           </a:p>
           <a:p>
             <a:pPr lvl="1">
@@ -15114,10 +15037,9 @@
               </a:lnSpc>
             </a:pPr>
             <a:r>
-              <a:rPr lang="pt-PT" sz="1300" dirty="0" smtClean="0"/>
+              <a:rPr lang="pt-PT" sz="1300" dirty="0"/>
               <a:t>Criação de rotas</a:t>
             </a:r>
-            <a:endParaRPr lang="pt-PT" sz="1300" dirty="0"/>
           </a:p>
           <a:p>
             <a:pPr lvl="1">
@@ -15126,10 +15048,9 @@
               </a:lnSpc>
             </a:pPr>
             <a:r>
-              <a:rPr lang="pt-PT" sz="1300" dirty="0" smtClean="0"/>
+              <a:rPr lang="pt-PT" sz="1300" dirty="0"/>
               <a:t>Comunicação entre Front-end e BD</a:t>
             </a:r>
-            <a:endParaRPr lang="pt-PT" sz="1300" dirty="0"/>
           </a:p>
           <a:p>
             <a:pPr>
@@ -15155,10 +15076,9 @@
               </a:lnSpc>
             </a:pPr>
             <a:r>
-              <a:rPr lang="pt-PT" sz="1300" dirty="0" smtClean="0"/>
+              <a:rPr lang="pt-PT" sz="1300" dirty="0"/>
               <a:t>Testar as diferentes componentes criadas</a:t>
             </a:r>
-            <a:endParaRPr lang="pt-PT" sz="1300" dirty="0"/>
           </a:p>
           <a:p>
             <a:pPr lvl="1">
@@ -15167,10 +15087,9 @@
               </a:lnSpc>
             </a:pPr>
             <a:r>
-              <a:rPr lang="pt-PT" sz="1300" dirty="0" smtClean="0"/>
+              <a:rPr lang="pt-PT" sz="1300" dirty="0"/>
               <a:t>Testar a aplicação final</a:t>
             </a:r>
-            <a:endParaRPr lang="pt-PT" sz="1300" dirty="0"/>
           </a:p>
         </p:txBody>
       </p:sp>
@@ -18086,10 +18005,9 @@
           <a:lstStyle/>
           <a:p>
             <a:r>
-              <a:rPr lang="pt-PT" b="1" dirty="0" smtClean="0"/>
+              <a:rPr lang="pt-PT" b="1" dirty="0"/>
               <a:t>Levantamento de Requisitos - Rafael</a:t>
             </a:r>
-            <a:endParaRPr lang="pt-PT" b="1" dirty="0"/>
           </a:p>
         </p:txBody>
       </p:sp>
@@ -18122,13 +18040,6 @@
   <p:clrMapOvr>
     <a:masterClrMapping/>
   </p:clrMapOvr>
-  <p:timing>
-    <p:tnLst>
-      <p:par>
-        <p:cTn id="1" dur="indefinite" restart="never" nodeType="tmRoot"/>
-      </p:par>
-    </p:tnLst>
-  </p:timing>
 </p:sld>
 </file>
 
@@ -18165,8 +18076,8 @@
           <a:lstStyle/>
           <a:p>
             <a:r>
-              <a:rPr lang="pt-PT" b="1" dirty="0" smtClean="0"/>
-              <a:t>Problemas Reais que o Projeto visa Resolver - Ricardo</a:t>
+              <a:rPr lang="pt-PT" b="1" dirty="0"/>
+              <a:t>Problemas Reais que o Projeto visa Resolver</a:t>
             </a:r>
             <a:endParaRPr lang="pt-PT" dirty="0"/>
           </a:p>
@@ -18182,12 +18093,63 @@
             <p:ph idx="1"/>
           </p:nvPr>
         </p:nvSpPr>
-        <p:spPr/>
+        <p:spPr>
+          <a:xfrm>
+            <a:off x="1154954" y="2603499"/>
+            <a:ext cx="8825659" cy="3952045"/>
+          </a:xfrm>
+        </p:spPr>
         <p:txBody>
-          <a:bodyPr/>
+          <a:bodyPr>
+            <a:normAutofit/>
+          </a:bodyPr>
           <a:lstStyle/>
           <a:p>
-            <a:endParaRPr lang="pt-PT"/>
+            <a:r>
+              <a:rPr lang="pt-PT" dirty="0"/>
+              <a:t>O </a:t>
+            </a:r>
+            <a:r>
+              <a:rPr lang="pt-PT" i="1" dirty="0" err="1"/>
+              <a:t>Projectary</a:t>
+            </a:r>
+            <a:r>
+              <a:rPr lang="pt-PT" dirty="0"/>
+              <a:t> visa resolver os seguintes problemas:</a:t>
+            </a:r>
+          </a:p>
+          <a:p>
+            <a:pPr lvl="1"/>
+            <a:r>
+              <a:rPr lang="pt-PT" dirty="0"/>
+              <a:t>Inexistência de uma plataforma onde os alunos possa ter conhecimento de todos os projetos finais aos quais se podem candidatar;</a:t>
+            </a:r>
+          </a:p>
+          <a:p>
+            <a:pPr lvl="1"/>
+            <a:r>
+              <a:rPr lang="pt-PT" dirty="0"/>
+              <a:t>Ausência de uma plataforma onde os alunos se podem candidatar aos projetos finais;</a:t>
+            </a:r>
+          </a:p>
+          <a:p>
+            <a:pPr lvl="1"/>
+            <a:r>
+              <a:rPr lang="pt-PT" dirty="0"/>
+              <a:t>Ausência de um sítio onde os professores podem dispor informações aos alunos e onde os alunos podem ter acesso a essas informações;</a:t>
+            </a:r>
+          </a:p>
+          <a:p>
+            <a:pPr lvl="1"/>
+            <a:r>
+              <a:rPr lang="pt-PT" dirty="0"/>
+              <a:t>Inexistência de uma plataforma onde todas as pessoas podem ter acesso aos projetos finais já realizados e a todas as informações que foram necessárias para a realização desse </a:t>
+            </a:r>
+            <a:r>
+              <a:rPr lang="pt-PT"/>
+              <a:t>projeto;</a:t>
+            </a:r>
+            <a:endParaRPr lang="pt-PT" dirty="0"/>
           </a:p>
         </p:txBody>
       </p:sp>
@@ -18201,13 +18163,6 @@
   <p:clrMapOvr>
     <a:masterClrMapping/>
   </p:clrMapOvr>
-  <p:timing>
-    <p:tnLst>
-      <p:par>
-        <p:cTn id="1" dur="indefinite" restart="never" nodeType="tmRoot"/>
-      </p:par>
-    </p:tnLst>
-  </p:timing>
 </p:sld>
 </file>
 
@@ -18244,7 +18199,7 @@
           <a:lstStyle/>
           <a:p>
             <a:r>
-              <a:rPr lang="pt-PT" b="1" dirty="0" smtClean="0"/>
+              <a:rPr lang="pt-PT" b="1" dirty="0"/>
               <a:t>Tipos de Utilizador - Alexandre</a:t>
             </a:r>
             <a:endParaRPr lang="pt-PT" dirty="0"/>
@@ -18316,10 +18271,9 @@
           <a:lstStyle/>
           <a:p>
             <a:r>
-              <a:rPr lang="pt-PT" b="1" dirty="0" smtClean="0"/>
+              <a:rPr lang="pt-PT" b="1" dirty="0"/>
               <a:t>Diagramas</a:t>
             </a:r>
-            <a:endParaRPr lang="pt-PT" b="1" dirty="0"/>
           </a:p>
         </p:txBody>
       </p:sp>
@@ -18357,13 +18311,6 @@
   <p:clrMapOvr>
     <a:masterClrMapping/>
   </p:clrMapOvr>
-  <p:timing>
-    <p:tnLst>
-      <p:par>
-        <p:cTn id="1" dur="indefinite" restart="never" nodeType="tmRoot"/>
-      </p:par>
-    </p:tnLst>
-  </p:timing>
 </p:sld>
 </file>
 
@@ -18400,10 +18347,9 @@
           <a:lstStyle/>
           <a:p>
             <a:r>
-              <a:rPr lang="pt-PT" b="1" dirty="0" smtClean="0"/>
+              <a:rPr lang="pt-PT" b="1" dirty="0"/>
               <a:t>O que ficou por fazer - Cristina</a:t>
             </a:r>
-            <a:endParaRPr lang="pt-PT" b="1" dirty="0"/>
           </a:p>
         </p:txBody>
       </p:sp>
@@ -18436,13 +18382,6 @@
   <p:clrMapOvr>
     <a:masterClrMapping/>
   </p:clrMapOvr>
-  <p:timing>
-    <p:tnLst>
-      <p:par>
-        <p:cTn id="1" dur="indefinite" restart="never" nodeType="tmRoot"/>
-      </p:par>
-    </p:tnLst>
-  </p:timing>
 </p:sld>
 </file>
 
@@ -18479,10 +18418,9 @@
           <a:lstStyle/>
           <a:p>
             <a:r>
-              <a:rPr lang="pt-PT" b="1" dirty="0" smtClean="0"/>
+              <a:rPr lang="pt-PT" b="1" dirty="0"/>
               <a:t>Melhorias do Projeto</a:t>
             </a:r>
-            <a:endParaRPr lang="pt-PT" b="1" dirty="0"/>
           </a:p>
         </p:txBody>
       </p:sp>
@@ -18515,13 +18453,6 @@
   <p:clrMapOvr>
     <a:masterClrMapping/>
   </p:clrMapOvr>
-  <p:timing>
-    <p:tnLst>
-      <p:par>
-        <p:cTn id="1" dur="indefinite" restart="never" nodeType="tmRoot"/>
-      </p:par>
-    </p:tnLst>
-  </p:timing>
 </p:sld>
 </file>
 

</xml_diff>